<commit_message>
update for new docker build method
</commit_message>
<xml_diff>
--- a/comp-repro.pptx
+++ b/comp-repro.pptx
@@ -4147,7 +4147,7 @@
             <a:pPr lvl="2"/>
             <a:r>
               <a:rPr lang="en-US" dirty="0"/>
-              <a:t>Click on work, click on </a:t>
+              <a:t>Click on </a:t>
             </a:r>
             <a:r>
               <a:rPr lang="en-US" dirty="0" err="1"/>
@@ -4305,7 +4305,7 @@
             <a:pPr lvl="2"/>
             <a:r>
               <a:rPr lang="en-US" dirty="0"/>
-              <a:t>Click on work, click on </a:t>
+              <a:t>Click on </a:t>
             </a:r>
             <a:r>
               <a:rPr lang="en-US" dirty="0" err="1"/>
@@ -4567,7 +4567,7 @@
         <p:spPr/>
         <p:txBody>
           <a:bodyPr>
-            <a:normAutofit fontScale="85000" lnSpcReduction="20000"/>
+            <a:normAutofit fontScale="92500" lnSpcReduction="20000"/>
           </a:bodyPr>
           <a:lstStyle/>
           <a:p>
@@ -4586,15 +4586,6 @@
             <a:r>
               <a:rPr lang="en-US" dirty="0"/>
               <a:t>In the terminal</a:t>
-            </a:r>
-          </a:p>
-          <a:p>
-            <a:pPr lvl="1"/>
-            <a:r>
-              <a:rPr lang="en-US" dirty="0">
-                <a:latin typeface="American Typewriter" panose="02090604020004020304" pitchFamily="18" charset="77"/>
-              </a:rPr>
-              <a:t>cd work</a:t>
             </a:r>
           </a:p>
           <a:p>
@@ -4796,13 +4787,21 @@
           <a:p>
             <a:r>
               <a:rPr lang="en-US" dirty="0"/>
-              <a:t>vi discussion</a:t>
-            </a:r>
-          </a:p>
-          <a:p>
-            <a:r>
-              <a:rPr lang="en-US" dirty="0"/>
               <a:t>Remove comment characters in line 19 to add a glass slab</a:t>
+            </a:r>
+          </a:p>
+          <a:p>
+            <a:pPr lvl="1"/>
+            <a:r>
+              <a:rPr lang="en-US" dirty="0"/>
+              <a:t>Edit in binder</a:t>
+            </a:r>
+          </a:p>
+          <a:p>
+            <a:pPr lvl="1"/>
+            <a:r>
+              <a:rPr lang="en-US" dirty="0"/>
+              <a:t>Or use vi from the terminal</a:t>
             </a:r>
           </a:p>
           <a:p>

</xml_diff>